<commit_message>
Update 05 Exploratory analysis of Big Data and Cloud - Big Data.pptx
</commit_message>
<xml_diff>
--- a/materials/PPT slides/05 Exploratory analysis of Big Data and Cloud - Big Data.pptx
+++ b/materials/PPT slides/05 Exploratory analysis of Big Data and Cloud - Big Data.pptx
@@ -7911,24 +7911,6 @@
           <a:p>
             <a:endParaRPr lang="en-US" altLang="en-GB"/>
           </a:p>
-          <a:p>
-            <a:endParaRPr lang="en-US" altLang="en-GB"/>
-          </a:p>
-          <a:p>
-            <a:endParaRPr lang="en-US" altLang="en-GB"/>
-          </a:p>
-          <a:p>
-            <a:endParaRPr lang="en-US" altLang="en-GB"/>
-          </a:p>
-          <a:p>
-            <a:endParaRPr lang="en-US" altLang="en-GB"/>
-          </a:p>
-          <a:p>
-            <a:endParaRPr lang="en-US" altLang="en-GB"/>
-          </a:p>
-          <a:p>
-            <a:endParaRPr lang="en-US" altLang="en-GB"/>
-          </a:p>
         </p:txBody>
       </p:sp>
     </p:spTree>

</xml_diff>